<commit_message>
update background, not finished
</commit_message>
<xml_diff>
--- a/doc/paper/image/overview/arch.pptx
+++ b/doc/paper/image/overview/arch.pptx
@@ -3633,7 +3633,7 @@
         </p:nvSpPr>
         <p:spPr>
           <a:xfrm>
-            <a:off x="5449016" y="758422"/>
+            <a:off x="5576018" y="758422"/>
             <a:ext cx="4915721" cy="3256641"/>
           </a:xfrm>
           <a:prstGeom prst="roundRect">
@@ -3681,7 +3681,7 @@
         </p:nvSpPr>
         <p:spPr>
           <a:xfrm>
-            <a:off x="6252608" y="1555884"/>
+            <a:off x="6379610" y="1555884"/>
             <a:ext cx="2904895" cy="1724193"/>
           </a:xfrm>
           <a:prstGeom prst="rect">
@@ -3727,7 +3727,7 @@
         </p:nvSpPr>
         <p:spPr>
           <a:xfrm>
-            <a:off x="6405008" y="1708284"/>
+            <a:off x="6532010" y="1708284"/>
             <a:ext cx="2904895" cy="1724193"/>
           </a:xfrm>
           <a:prstGeom prst="rect">
@@ -3773,7 +3773,7 @@
         </p:nvSpPr>
         <p:spPr>
           <a:xfrm>
-            <a:off x="6557408" y="1860684"/>
+            <a:off x="6684410" y="1860684"/>
             <a:ext cx="2904895" cy="1724193"/>
           </a:xfrm>
           <a:prstGeom prst="rect">
@@ -3819,7 +3819,7 @@
         </p:nvSpPr>
         <p:spPr>
           <a:xfrm>
-            <a:off x="6557408" y="2233637"/>
+            <a:off x="6684410" y="2233637"/>
             <a:ext cx="2904895" cy="1046440"/>
           </a:xfrm>
           <a:prstGeom prst="rect">
@@ -3850,7 +3850,7 @@
         </p:nvSpPr>
         <p:spPr>
           <a:xfrm>
-            <a:off x="11196027" y="1617341"/>
+            <a:off x="11323029" y="1617341"/>
             <a:ext cx="2904895" cy="1724193"/>
           </a:xfrm>
           <a:prstGeom prst="rect">
@@ -3896,7 +3896,7 @@
         </p:nvSpPr>
         <p:spPr>
           <a:xfrm>
-            <a:off x="11348427" y="1769741"/>
+            <a:off x="11475429" y="1769741"/>
             <a:ext cx="2904895" cy="1724193"/>
           </a:xfrm>
           <a:prstGeom prst="rect">
@@ -3942,7 +3942,7 @@
         </p:nvSpPr>
         <p:spPr>
           <a:xfrm>
-            <a:off x="11500827" y="1922141"/>
+            <a:off x="11627829" y="1922141"/>
             <a:ext cx="2904895" cy="1724193"/>
           </a:xfrm>
           <a:prstGeom prst="rect">
@@ -3988,7 +3988,7 @@
         </p:nvSpPr>
         <p:spPr>
           <a:xfrm>
-            <a:off x="11500827" y="2304869"/>
+            <a:off x="11627829" y="2304869"/>
             <a:ext cx="2904895" cy="1046440"/>
           </a:xfrm>
           <a:prstGeom prst="rect">
@@ -4019,7 +4019,7 @@
         </p:nvSpPr>
         <p:spPr>
           <a:xfrm>
-            <a:off x="5295750" y="767722"/>
+            <a:off x="5422752" y="767722"/>
             <a:ext cx="5068987" cy="569387"/>
           </a:xfrm>
           <a:prstGeom prst="rect">
@@ -4089,7 +4089,7 @@
         </p:nvSpPr>
         <p:spPr>
           <a:xfrm>
-            <a:off x="1397660" y="1608336"/>
+            <a:off x="1524662" y="1608336"/>
             <a:ext cx="2904895" cy="1724193"/>
           </a:xfrm>
           <a:prstGeom prst="rect">
@@ -4135,7 +4135,7 @@
         </p:nvSpPr>
         <p:spPr>
           <a:xfrm>
-            <a:off x="1550060" y="1760736"/>
+            <a:off x="1677062" y="1760736"/>
             <a:ext cx="2904895" cy="1724193"/>
           </a:xfrm>
           <a:prstGeom prst="rect">
@@ -4181,7 +4181,7 @@
         </p:nvSpPr>
         <p:spPr>
           <a:xfrm>
-            <a:off x="1702460" y="1913136"/>
+            <a:off x="1829462" y="1913136"/>
             <a:ext cx="2904895" cy="1724193"/>
           </a:xfrm>
           <a:prstGeom prst="rect">
@@ -4227,7 +4227,7 @@
         </p:nvSpPr>
         <p:spPr>
           <a:xfrm>
-            <a:off x="1702460" y="2295864"/>
+            <a:off x="1829462" y="2295864"/>
             <a:ext cx="2904895" cy="1046440"/>
           </a:xfrm>
           <a:prstGeom prst="rect">
@@ -4542,7 +4542,7 @@
         </p:nvSpPr>
         <p:spPr>
           <a:xfrm>
-            <a:off x="10807591" y="7176756"/>
+            <a:off x="10849925" y="7176756"/>
             <a:ext cx="3382230" cy="1802682"/>
           </a:xfrm>
           <a:prstGeom prst="ellipse">
@@ -4588,7 +4588,7 @@
         </p:nvSpPr>
         <p:spPr>
           <a:xfrm>
-            <a:off x="11152991" y="8312667"/>
+            <a:off x="11195325" y="8312667"/>
             <a:ext cx="2712754" cy="569387"/>
           </a:xfrm>
           <a:prstGeom prst="rect">
@@ -4618,7 +4618,7 @@
         </p:nvCxnSpPr>
         <p:spPr>
           <a:xfrm>
-            <a:off x="12466194" y="6499386"/>
+            <a:off x="12593196" y="6499386"/>
             <a:ext cx="0" cy="1072626"/>
           </a:xfrm>
           <a:prstGeom prst="straightConnector1">
@@ -4658,7 +4658,7 @@
         </p:nvSpPr>
         <p:spPr>
           <a:xfrm>
-            <a:off x="11592172" y="7635513"/>
+            <a:off x="11634506" y="7635513"/>
             <a:ext cx="1978041" cy="624453"/>
           </a:xfrm>
           <a:prstGeom prst="roundRect">
@@ -4702,7 +4702,7 @@
         </p:nvSpPr>
         <p:spPr>
           <a:xfrm>
-            <a:off x="11500827" y="7698470"/>
+            <a:off x="11543161" y="7698470"/>
             <a:ext cx="1978041" cy="569387"/>
           </a:xfrm>
           <a:prstGeom prst="rect">
@@ -4732,7 +4732,7 @@
         </p:nvSpPr>
         <p:spPr>
           <a:xfrm>
-            <a:off x="4822098" y="2295864"/>
+            <a:off x="4949100" y="2295864"/>
             <a:ext cx="1253836" cy="687485"/>
           </a:xfrm>
           <a:prstGeom prst="rightArrow">
@@ -5077,7 +5077,7 @@
         </p:nvSpPr>
         <p:spPr>
           <a:xfrm>
-            <a:off x="9709899" y="1922141"/>
+            <a:off x="9836901" y="1922141"/>
             <a:ext cx="1310206" cy="721196"/>
           </a:xfrm>
           <a:prstGeom prst="rightArrow">
@@ -5123,7 +5123,7 @@
         </p:nvSpPr>
         <p:spPr>
           <a:xfrm rot="10800000">
-            <a:off x="9709899" y="2694812"/>
+            <a:off x="9836901" y="2694812"/>
             <a:ext cx="1310206" cy="721196"/>
           </a:xfrm>
           <a:prstGeom prst="rightArrow">

</xml_diff>